<commit_message>
Committing the updated ppt.
</commit_message>
<xml_diff>
--- a/Github Commands.pptx
+++ b/Github Commands.pptx
@@ -11,6 +11,12 @@
     <p:sldId id="259" r:id="rId5"/>
     <p:sldId id="260" r:id="rId6"/>
     <p:sldId id="261" r:id="rId7"/>
+    <p:sldId id="262" r:id="rId8"/>
+    <p:sldId id="263" r:id="rId9"/>
+    <p:sldId id="264" r:id="rId10"/>
+    <p:sldId id="265" r:id="rId11"/>
+    <p:sldId id="266" r:id="rId12"/>
+    <p:sldId id="267" r:id="rId13"/>
   </p:sldIdLst>
   <p:sldSz cx="12192000" cy="6858000"/>
   <p:notesSz cx="6858000" cy="9144000"/>
@@ -3389,6 +3395,826 @@
 </p:sld>
 </file>
 
+<file path=ppt/slides/slide10.xml><?xml version="1.0" encoding="utf-8"?>
+<p:sld xmlns:a="http://schemas.openxmlformats.org/drawingml/2006/main" xmlns:r="http://schemas.openxmlformats.org/officeDocument/2006/relationships" xmlns:p="http://schemas.openxmlformats.org/presentationml/2006/main">
+  <p:cSld>
+    <p:spTree>
+      <p:nvGrpSpPr>
+        <p:cNvPr id="1" name=""/>
+        <p:cNvGrpSpPr/>
+        <p:nvPr/>
+      </p:nvGrpSpPr>
+      <p:grpSpPr>
+        <a:xfrm>
+          <a:off x="0" y="0"/>
+          <a:ext cx="0" cy="0"/>
+          <a:chOff x="0" y="0"/>
+          <a:chExt cx="0" cy="0"/>
+        </a:xfrm>
+      </p:grpSpPr>
+      <p:sp>
+        <p:nvSpPr>
+          <p:cNvPr id="4" name="Title 1">
+            <a:extLst>
+              <a:ext uri="{FF2B5EF4-FFF2-40B4-BE49-F238E27FC236}">
+                <a16:creationId xmlns:a16="http://schemas.microsoft.com/office/drawing/2014/main" id="{7B2CCDE4-3417-266F-8576-6130140A6F51}"/>
+              </a:ext>
+            </a:extLst>
+          </p:cNvPr>
+          <p:cNvSpPr txBox="1">
+            <a:spLocks/>
+          </p:cNvSpPr>
+          <p:nvPr/>
+        </p:nvSpPr>
+        <p:spPr>
+          <a:xfrm>
+            <a:off x="245772" y="262095"/>
+            <a:ext cx="10515600" cy="356092"/>
+          </a:xfrm>
+          <a:prstGeom prst="rect">
+            <a:avLst/>
+          </a:prstGeom>
+        </p:spPr>
+        <p:txBody>
+          <a:bodyPr vert="horz" lIns="91440" tIns="45720" rIns="91440" bIns="45720" rtlCol="0" anchor="ctr">
+            <a:noAutofit/>
+          </a:bodyPr>
+          <a:lstStyle>
+            <a:lvl1pPr algn="l" defTabSz="914400" rtl="0" eaLnBrk="1" latinLnBrk="0" hangingPunct="1">
+              <a:lnSpc>
+                <a:spcPct val="90000"/>
+              </a:lnSpc>
+              <a:spcBef>
+                <a:spcPct val="0"/>
+              </a:spcBef>
+              <a:buNone/>
+              <a:defRPr sz="4400" kern="1200">
+                <a:solidFill>
+                  <a:schemeClr val="tx1"/>
+                </a:solidFill>
+                <a:latin typeface="+mj-lt"/>
+                <a:ea typeface="+mj-ea"/>
+                <a:cs typeface="+mj-cs"/>
+              </a:defRPr>
+            </a:lvl1pPr>
+          </a:lstStyle>
+          <a:p>
+            <a:r>
+              <a:rPr lang="en-US" sz="3200" dirty="0"/>
+              <a:t>Merging other branch to master branch</a:t>
+            </a:r>
+          </a:p>
+        </p:txBody>
+      </p:sp>
+      <mc:AlternateContent xmlns:mc="http://schemas.openxmlformats.org/markup-compatibility/2006">
+        <mc:Choice xmlns:a14="http://schemas.microsoft.com/office/drawing/2010/main" Requires="a14">
+          <p:sp>
+            <p:nvSpPr>
+              <p:cNvPr id="5" name="TextBox 4">
+                <a:extLst>
+                  <a:ext uri="{FF2B5EF4-FFF2-40B4-BE49-F238E27FC236}">
+                    <a16:creationId xmlns:a16="http://schemas.microsoft.com/office/drawing/2014/main" id="{D5BF51CE-C219-1694-0DAC-7EE099BA40AF}"/>
+                  </a:ext>
+                </a:extLst>
+              </p:cNvPr>
+              <p:cNvSpPr txBox="1"/>
+              <p:nvPr/>
+            </p:nvSpPr>
+            <p:spPr>
+              <a:xfrm>
+                <a:off x="425003" y="824248"/>
+                <a:ext cx="11372045" cy="1754326"/>
+              </a:xfrm>
+              <a:prstGeom prst="rect">
+                <a:avLst/>
+              </a:prstGeom>
+              <a:noFill/>
+            </p:spPr>
+            <p:txBody>
+              <a:bodyPr wrap="square" rtlCol="0">
+                <a:spAutoFit/>
+              </a:bodyPr>
+              <a:lstStyle/>
+              <a:p>
+                <a:r>
+                  <a:rPr lang="en-US" dirty="0"/>
+                  <a:t>For this, you need to be in master branch.</a:t>
+                </a:r>
+              </a:p>
+              <a:p>
+                <a:endParaRPr lang="en-US" dirty="0"/>
+              </a:p>
+              <a:p>
+                <a:pPr/>
+                <a14:m>
+                  <m:oMathPara xmlns:m="http://schemas.openxmlformats.org/officeDocument/2006/math">
+                    <m:oMathParaPr>
+                      <m:jc m:val="left"/>
+                    </m:oMathParaPr>
+                    <m:oMath xmlns:m="http://schemas.openxmlformats.org/officeDocument/2006/math">
+                      <m:r>
+                        <a:rPr lang="en-US" b="0" i="1" smtClean="0">
+                          <a:latin typeface="Cambria Math" panose="02040503050406030204" pitchFamily="18" charset="0"/>
+                        </a:rPr>
+                        <m:t>$ </m:t>
+                      </m:r>
+                      <m:r>
+                        <a:rPr lang="en-US" b="0" i="1" smtClean="0">
+                          <a:latin typeface="Cambria Math" panose="02040503050406030204" pitchFamily="18" charset="0"/>
+                        </a:rPr>
+                        <m:t>𝑔𝑖𝑡</m:t>
+                      </m:r>
+                      <m:r>
+                        <a:rPr lang="en-US" b="0" i="1" smtClean="0">
+                          <a:latin typeface="Cambria Math" panose="02040503050406030204" pitchFamily="18" charset="0"/>
+                        </a:rPr>
+                        <m:t> </m:t>
+                      </m:r>
+                      <m:r>
+                        <a:rPr lang="en-US" b="0" i="1" smtClean="0">
+                          <a:latin typeface="Cambria Math" panose="02040503050406030204" pitchFamily="18" charset="0"/>
+                        </a:rPr>
+                        <m:t>𝑚𝑒𝑟𝑔𝑒</m:t>
+                      </m:r>
+                      <m:r>
+                        <a:rPr lang="en-US" b="0" i="1" smtClean="0">
+                          <a:latin typeface="Cambria Math" panose="02040503050406030204" pitchFamily="18" charset="0"/>
+                        </a:rPr>
+                        <m:t>&lt;</m:t>
+                      </m:r>
+                      <m:r>
+                        <a:rPr lang="en-US" b="0" i="1" smtClean="0">
+                          <a:latin typeface="Cambria Math" panose="02040503050406030204" pitchFamily="18" charset="0"/>
+                        </a:rPr>
+                        <m:t>𝑜𝑡h𝑒𝑟</m:t>
+                      </m:r>
+                      <m:r>
+                        <a:rPr lang="en-US" b="0" i="1" smtClean="0">
+                          <a:latin typeface="Cambria Math" panose="02040503050406030204" pitchFamily="18" charset="0"/>
+                        </a:rPr>
+                        <m:t> </m:t>
+                      </m:r>
+                      <m:r>
+                        <a:rPr lang="en-US" b="0" i="1" smtClean="0">
+                          <a:latin typeface="Cambria Math" panose="02040503050406030204" pitchFamily="18" charset="0"/>
+                        </a:rPr>
+                        <m:t>𝑏𝑟𝑎𝑛𝑐h</m:t>
+                      </m:r>
+                      <m:r>
+                        <a:rPr lang="en-US" b="0" i="1" smtClean="0">
+                          <a:latin typeface="Cambria Math" panose="02040503050406030204" pitchFamily="18" charset="0"/>
+                        </a:rPr>
+                        <m:t> </m:t>
+                      </m:r>
+                      <m:r>
+                        <a:rPr lang="en-US" b="0" i="1" smtClean="0">
+                          <a:latin typeface="Cambria Math" panose="02040503050406030204" pitchFamily="18" charset="0"/>
+                        </a:rPr>
+                        <m:t>𝑛𝑎𝑚𝑒</m:t>
+                      </m:r>
+                      <m:r>
+                        <a:rPr lang="en-US" b="0" i="1" smtClean="0">
+                          <a:latin typeface="Cambria Math" panose="02040503050406030204" pitchFamily="18" charset="0"/>
+                        </a:rPr>
+                        <m:t> </m:t>
+                      </m:r>
+                      <m:r>
+                        <a:rPr lang="en-US" b="0" i="1" smtClean="0">
+                          <a:latin typeface="Cambria Math" panose="02040503050406030204" pitchFamily="18" charset="0"/>
+                        </a:rPr>
+                        <m:t>𝑤h𝑖𝑐h</m:t>
+                      </m:r>
+                      <m:r>
+                        <a:rPr lang="en-US" b="0" i="1" smtClean="0">
+                          <a:latin typeface="Cambria Math" panose="02040503050406030204" pitchFamily="18" charset="0"/>
+                        </a:rPr>
+                        <m:t> </m:t>
+                      </m:r>
+                      <m:r>
+                        <a:rPr lang="en-US" b="0" i="1" smtClean="0">
+                          <a:latin typeface="Cambria Math" panose="02040503050406030204" pitchFamily="18" charset="0"/>
+                        </a:rPr>
+                        <m:t>𝑤𝑒</m:t>
+                      </m:r>
+                      <m:r>
+                        <a:rPr lang="en-US" b="0" i="1" smtClean="0">
+                          <a:latin typeface="Cambria Math" panose="02040503050406030204" pitchFamily="18" charset="0"/>
+                        </a:rPr>
+                        <m:t> </m:t>
+                      </m:r>
+                      <m:r>
+                        <a:rPr lang="en-US" b="0" i="1" smtClean="0">
+                          <a:latin typeface="Cambria Math" panose="02040503050406030204" pitchFamily="18" charset="0"/>
+                        </a:rPr>
+                        <m:t>𝑤𝑎𝑛𝑡</m:t>
+                      </m:r>
+                      <m:r>
+                        <a:rPr lang="en-US" b="0" i="1" smtClean="0">
+                          <a:latin typeface="Cambria Math" panose="02040503050406030204" pitchFamily="18" charset="0"/>
+                        </a:rPr>
+                        <m:t> </m:t>
+                      </m:r>
+                      <m:r>
+                        <a:rPr lang="en-US" b="0" i="1" smtClean="0">
+                          <a:latin typeface="Cambria Math" panose="02040503050406030204" pitchFamily="18" charset="0"/>
+                        </a:rPr>
+                        <m:t>𝑡𝑜</m:t>
+                      </m:r>
+                      <m:r>
+                        <a:rPr lang="en-US" b="0" i="1" smtClean="0">
+                          <a:latin typeface="Cambria Math" panose="02040503050406030204" pitchFamily="18" charset="0"/>
+                        </a:rPr>
+                        <m:t> </m:t>
+                      </m:r>
+                      <m:r>
+                        <a:rPr lang="en-US" b="0" i="1" smtClean="0">
+                          <a:latin typeface="Cambria Math" panose="02040503050406030204" pitchFamily="18" charset="0"/>
+                        </a:rPr>
+                        <m:t>𝑚𝑒𝑟𝑔𝑒</m:t>
+                      </m:r>
+                      <m:r>
+                        <a:rPr lang="en-US" b="0" i="1" smtClean="0">
+                          <a:latin typeface="Cambria Math" panose="02040503050406030204" pitchFamily="18" charset="0"/>
+                        </a:rPr>
+                        <m:t> </m:t>
+                      </m:r>
+                      <m:r>
+                        <a:rPr lang="en-US" b="0" i="1" smtClean="0">
+                          <a:latin typeface="Cambria Math" panose="02040503050406030204" pitchFamily="18" charset="0"/>
+                        </a:rPr>
+                        <m:t>𝑡𝑜</m:t>
+                      </m:r>
+                      <m:r>
+                        <a:rPr lang="en-US" b="0" i="1" smtClean="0">
+                          <a:latin typeface="Cambria Math" panose="02040503050406030204" pitchFamily="18" charset="0"/>
+                        </a:rPr>
+                        <m:t> </m:t>
+                      </m:r>
+                      <m:r>
+                        <a:rPr lang="en-US" b="0" i="1" smtClean="0">
+                          <a:latin typeface="Cambria Math" panose="02040503050406030204" pitchFamily="18" charset="0"/>
+                        </a:rPr>
+                        <m:t>𝑚𝑎𝑠𝑡𝑒𝑟</m:t>
+                      </m:r>
+                      <m:r>
+                        <a:rPr lang="en-US" b="0" i="1" smtClean="0">
+                          <a:latin typeface="Cambria Math" panose="02040503050406030204" pitchFamily="18" charset="0"/>
+                        </a:rPr>
+                        <m:t> </m:t>
+                      </m:r>
+                      <m:r>
+                        <a:rPr lang="en-US" b="0" i="1" smtClean="0">
+                          <a:latin typeface="Cambria Math" panose="02040503050406030204" pitchFamily="18" charset="0"/>
+                        </a:rPr>
+                        <m:t>𝑏𝑟𝑎𝑛𝑐h</m:t>
+                      </m:r>
+                      <m:r>
+                        <a:rPr lang="en-US" b="0" i="1" smtClean="0">
+                          <a:latin typeface="Cambria Math" panose="02040503050406030204" pitchFamily="18" charset="0"/>
+                        </a:rPr>
+                        <m:t>&gt;</m:t>
+                      </m:r>
+                    </m:oMath>
+                  </m:oMathPara>
+                </a14:m>
+                <a:endParaRPr lang="en-US" dirty="0"/>
+              </a:p>
+              <a:p>
+                <a:pPr/>
+                <a:endParaRPr lang="en-US" dirty="0"/>
+              </a:p>
+              <a:p>
+                <a:pPr/>
+                <a:r>
+                  <a:rPr lang="en-US" dirty="0"/>
+                  <a:t>It will open the text editor to write down the comment for the merge.</a:t>
+                </a:r>
+              </a:p>
+              <a:p>
+                <a:pPr/>
+                <a:endParaRPr lang="en-US" dirty="0"/>
+              </a:p>
+            </p:txBody>
+          </p:sp>
+        </mc:Choice>
+        <mc:Fallback>
+          <p:sp>
+            <p:nvSpPr>
+              <p:cNvPr id="5" name="TextBox 4">
+                <a:extLst>
+                  <a:ext uri="{FF2B5EF4-FFF2-40B4-BE49-F238E27FC236}">
+                    <a16:creationId xmlns:a16="http://schemas.microsoft.com/office/drawing/2014/main" id="{D5BF51CE-C219-1694-0DAC-7EE099BA40AF}"/>
+                  </a:ext>
+                </a:extLst>
+              </p:cNvPr>
+              <p:cNvSpPr txBox="1">
+                <a:spLocks noRot="1" noChangeAspect="1" noMove="1" noResize="1" noEditPoints="1" noAdjustHandles="1" noChangeArrowheads="1" noChangeShapeType="1" noTextEdit="1"/>
+              </p:cNvSpPr>
+              <p:nvPr/>
+            </p:nvSpPr>
+            <p:spPr>
+              <a:xfrm>
+                <a:off x="425003" y="824248"/>
+                <a:ext cx="11372045" cy="1754326"/>
+              </a:xfrm>
+              <a:prstGeom prst="rect">
+                <a:avLst/>
+              </a:prstGeom>
+              <a:blipFill>
+                <a:blip r:embed="rId2"/>
+                <a:stretch>
+                  <a:fillRect l="-483" t="-1736"/>
+                </a:stretch>
+              </a:blipFill>
+            </p:spPr>
+            <p:txBody>
+              <a:bodyPr/>
+              <a:lstStyle/>
+              <a:p>
+                <a:r>
+                  <a:rPr lang="en-US">
+                    <a:noFill/>
+                  </a:rPr>
+                  <a:t> </a:t>
+                </a:r>
+              </a:p>
+            </p:txBody>
+          </p:sp>
+        </mc:Fallback>
+      </mc:AlternateContent>
+    </p:spTree>
+    <p:extLst>
+      <p:ext uri="{BB962C8B-B14F-4D97-AF65-F5344CB8AC3E}">
+        <p14:creationId xmlns:p14="http://schemas.microsoft.com/office/powerpoint/2010/main" val="3052229656"/>
+      </p:ext>
+    </p:extLst>
+  </p:cSld>
+  <p:clrMapOvr>
+    <a:masterClrMapping/>
+  </p:clrMapOvr>
+</p:sld>
+</file>
+
+<file path=ppt/slides/slide11.xml><?xml version="1.0" encoding="utf-8"?>
+<p:sld xmlns:a="http://schemas.openxmlformats.org/drawingml/2006/main" xmlns:r="http://schemas.openxmlformats.org/officeDocument/2006/relationships" xmlns:p="http://schemas.openxmlformats.org/presentationml/2006/main">
+  <p:cSld>
+    <p:spTree>
+      <p:nvGrpSpPr>
+        <p:cNvPr id="1" name=""/>
+        <p:cNvGrpSpPr/>
+        <p:nvPr/>
+      </p:nvGrpSpPr>
+      <p:grpSpPr>
+        <a:xfrm>
+          <a:off x="0" y="0"/>
+          <a:ext cx="0" cy="0"/>
+          <a:chOff x="0" y="0"/>
+          <a:chExt cx="0" cy="0"/>
+        </a:xfrm>
+      </p:grpSpPr>
+      <p:sp>
+        <p:nvSpPr>
+          <p:cNvPr id="4" name="Title 1">
+            <a:extLst>
+              <a:ext uri="{FF2B5EF4-FFF2-40B4-BE49-F238E27FC236}">
+                <a16:creationId xmlns:a16="http://schemas.microsoft.com/office/drawing/2014/main" id="{BF79977B-3CF2-7F99-A5D6-9E7F19599A95}"/>
+              </a:ext>
+            </a:extLst>
+          </p:cNvPr>
+          <p:cNvSpPr txBox="1">
+            <a:spLocks/>
+          </p:cNvSpPr>
+          <p:nvPr/>
+        </p:nvSpPr>
+        <p:spPr>
+          <a:xfrm>
+            <a:off x="245772" y="262095"/>
+            <a:ext cx="10515600" cy="356092"/>
+          </a:xfrm>
+          <a:prstGeom prst="rect">
+            <a:avLst/>
+          </a:prstGeom>
+        </p:spPr>
+        <p:txBody>
+          <a:bodyPr vert="horz" lIns="91440" tIns="45720" rIns="91440" bIns="45720" rtlCol="0" anchor="ctr">
+            <a:noAutofit/>
+          </a:bodyPr>
+          <a:lstStyle>
+            <a:lvl1pPr algn="l" defTabSz="914400" rtl="0" eaLnBrk="1" latinLnBrk="0" hangingPunct="1">
+              <a:lnSpc>
+                <a:spcPct val="90000"/>
+              </a:lnSpc>
+              <a:spcBef>
+                <a:spcPct val="0"/>
+              </a:spcBef>
+              <a:buNone/>
+              <a:defRPr sz="4400" kern="1200">
+                <a:solidFill>
+                  <a:schemeClr val="tx1"/>
+                </a:solidFill>
+                <a:latin typeface="+mj-lt"/>
+                <a:ea typeface="+mj-ea"/>
+                <a:cs typeface="+mj-cs"/>
+              </a:defRPr>
+            </a:lvl1pPr>
+          </a:lstStyle>
+          <a:p>
+            <a:r>
+              <a:rPr lang="en-US" sz="3200" dirty="0"/>
+              <a:t>Connecting to a remote git host</a:t>
+            </a:r>
+          </a:p>
+        </p:txBody>
+      </p:sp>
+      <mc:AlternateContent xmlns:mc="http://schemas.openxmlformats.org/markup-compatibility/2006">
+        <mc:Choice xmlns:a14="http://schemas.microsoft.com/office/drawing/2010/main" Requires="a14">
+          <p:sp>
+            <p:nvSpPr>
+              <p:cNvPr id="5" name="TextBox 4">
+                <a:extLst>
+                  <a:ext uri="{FF2B5EF4-FFF2-40B4-BE49-F238E27FC236}">
+                    <a16:creationId xmlns:a16="http://schemas.microsoft.com/office/drawing/2014/main" id="{5AAF5E6E-562A-D68C-1952-FA3B840B8817}"/>
+                  </a:ext>
+                </a:extLst>
+              </p:cNvPr>
+              <p:cNvSpPr txBox="1"/>
+              <p:nvPr/>
+            </p:nvSpPr>
+            <p:spPr>
+              <a:xfrm>
+                <a:off x="244699" y="965915"/>
+                <a:ext cx="11642501" cy="923330"/>
+              </a:xfrm>
+              <a:prstGeom prst="rect">
+                <a:avLst/>
+              </a:prstGeom>
+              <a:noFill/>
+            </p:spPr>
+            <p:txBody>
+              <a:bodyPr wrap="square" rtlCol="0">
+                <a:spAutoFit/>
+              </a:bodyPr>
+              <a:lstStyle/>
+              <a:p>
+                <a:r>
+                  <a:rPr lang="en-US" b="0" dirty="0"/>
+                  <a:t>Run </a:t>
+                </a:r>
+                <a14:m>
+                  <m:oMath xmlns:m="http://schemas.openxmlformats.org/officeDocument/2006/math">
+                    <m:r>
+                      <a:rPr lang="en-US" b="0" i="1" smtClean="0">
+                        <a:latin typeface="Cambria Math" panose="02040503050406030204" pitchFamily="18" charset="0"/>
+                      </a:rPr>
+                      <m:t>$ </m:t>
+                    </m:r>
+                    <m:r>
+                      <a:rPr lang="en-US" b="0" i="1" smtClean="0">
+                        <a:latin typeface="Cambria Math" panose="02040503050406030204" pitchFamily="18" charset="0"/>
+                      </a:rPr>
+                      <m:t>𝑔𝑖𝑡</m:t>
+                    </m:r>
+                    <m:r>
+                      <a:rPr lang="en-US" b="0" i="1" smtClean="0">
+                        <a:latin typeface="Cambria Math" panose="02040503050406030204" pitchFamily="18" charset="0"/>
+                      </a:rPr>
+                      <m:t> </m:t>
+                    </m:r>
+                    <m:r>
+                      <a:rPr lang="en-US" b="0" i="1" smtClean="0">
+                        <a:latin typeface="Cambria Math" panose="02040503050406030204" pitchFamily="18" charset="0"/>
+                      </a:rPr>
+                      <m:t>𝑟𝑒𝑚𝑜𝑡𝑒</m:t>
+                    </m:r>
+                    <m:r>
+                      <a:rPr lang="en-US" b="0" i="1" smtClean="0">
+                        <a:latin typeface="Cambria Math" panose="02040503050406030204" pitchFamily="18" charset="0"/>
+                      </a:rPr>
+                      <m:t> </m:t>
+                    </m:r>
+                    <m:r>
+                      <a:rPr lang="en-US" b="0" i="1" smtClean="0">
+                        <a:latin typeface="Cambria Math" panose="02040503050406030204" pitchFamily="18" charset="0"/>
+                      </a:rPr>
+                      <m:t>𝑎𝑑𝑑</m:t>
+                    </m:r>
+                    <m:r>
+                      <a:rPr lang="en-US" b="0" i="1" smtClean="0">
+                        <a:latin typeface="Cambria Math" panose="02040503050406030204" pitchFamily="18" charset="0"/>
+                      </a:rPr>
+                      <m:t>&lt;</m:t>
+                    </m:r>
+                    <m:r>
+                      <a:rPr lang="en-US" b="0" i="1" smtClean="0">
+                        <a:latin typeface="Cambria Math" panose="02040503050406030204" pitchFamily="18" charset="0"/>
+                      </a:rPr>
+                      <m:t>𝑟𝑒𝑝𝑜</m:t>
+                    </m:r>
+                    <m:r>
+                      <a:rPr lang="en-US" b="0" i="1" smtClean="0">
+                        <a:latin typeface="Cambria Math" panose="02040503050406030204" pitchFamily="18" charset="0"/>
+                      </a:rPr>
+                      <m:t> </m:t>
+                    </m:r>
+                    <m:r>
+                      <a:rPr lang="en-US" b="0" i="1" smtClean="0">
+                        <a:latin typeface="Cambria Math" panose="02040503050406030204" pitchFamily="18" charset="0"/>
+                      </a:rPr>
+                      <m:t>𝑠h𝑜𝑟𝑡𝑐𝑢𝑡</m:t>
+                    </m:r>
+                    <m:r>
+                      <a:rPr lang="en-US" b="0" i="1" smtClean="0">
+                        <a:latin typeface="Cambria Math" panose="02040503050406030204" pitchFamily="18" charset="0"/>
+                      </a:rPr>
+                      <m:t> </m:t>
+                    </m:r>
+                    <m:r>
+                      <a:rPr lang="en-US" b="0" i="1" smtClean="0">
+                        <a:latin typeface="Cambria Math" panose="02040503050406030204" pitchFamily="18" charset="0"/>
+                      </a:rPr>
+                      <m:t>𝑛𝑎𝑚𝑒</m:t>
+                    </m:r>
+                    <m:r>
+                      <a:rPr lang="en-US" b="0" i="1" smtClean="0">
+                        <a:latin typeface="Cambria Math" panose="02040503050406030204" pitchFamily="18" charset="0"/>
+                      </a:rPr>
+                      <m:t>&gt; &lt;</m:t>
+                    </m:r>
+                    <m:r>
+                      <a:rPr lang="en-US" b="0" i="1" smtClean="0">
+                        <a:latin typeface="Cambria Math" panose="02040503050406030204" pitchFamily="18" charset="0"/>
+                      </a:rPr>
+                      <m:t>𝑟𝑒𝑝𝑜</m:t>
+                    </m:r>
+                    <m:r>
+                      <a:rPr lang="en-US" b="0" i="1" smtClean="0">
+                        <a:latin typeface="Cambria Math" panose="02040503050406030204" pitchFamily="18" charset="0"/>
+                      </a:rPr>
+                      <m:t> </m:t>
+                    </m:r>
+                    <m:r>
+                      <a:rPr lang="en-US" b="0" i="1" smtClean="0">
+                        <a:latin typeface="Cambria Math" panose="02040503050406030204" pitchFamily="18" charset="0"/>
+                      </a:rPr>
+                      <m:t>𝑢𝑟𝑙</m:t>
+                    </m:r>
+                    <m:r>
+                      <a:rPr lang="en-US" b="0" i="1" smtClean="0">
+                        <a:latin typeface="Cambria Math" panose="02040503050406030204" pitchFamily="18" charset="0"/>
+                      </a:rPr>
+                      <m:t>&gt;</m:t>
+                    </m:r>
+                  </m:oMath>
+                </a14:m>
+                <a:r>
+                  <a:rPr lang="en-US" dirty="0"/>
+                  <a:t> to connect.</a:t>
+                </a:r>
+              </a:p>
+              <a:p>
+                <a:endParaRPr lang="en-US" dirty="0"/>
+              </a:p>
+              <a:p>
+                <a:r>
+                  <a:rPr lang="en-US" dirty="0"/>
+                  <a:t>github_moon44</a:t>
+                </a:r>
+              </a:p>
+            </p:txBody>
+          </p:sp>
+        </mc:Choice>
+        <mc:Fallback>
+          <p:sp>
+            <p:nvSpPr>
+              <p:cNvPr id="5" name="TextBox 4">
+                <a:extLst>
+                  <a:ext uri="{FF2B5EF4-FFF2-40B4-BE49-F238E27FC236}">
+                    <a16:creationId xmlns:a16="http://schemas.microsoft.com/office/drawing/2014/main" id="{5AAF5E6E-562A-D68C-1952-FA3B840B8817}"/>
+                  </a:ext>
+                </a:extLst>
+              </p:cNvPr>
+              <p:cNvSpPr txBox="1">
+                <a:spLocks noRot="1" noChangeAspect="1" noMove="1" noResize="1" noEditPoints="1" noAdjustHandles="1" noChangeArrowheads="1" noChangeShapeType="1" noTextEdit="1"/>
+              </p:cNvSpPr>
+              <p:nvPr/>
+            </p:nvSpPr>
+            <p:spPr>
+              <a:xfrm>
+                <a:off x="244699" y="965915"/>
+                <a:ext cx="11642501" cy="923330"/>
+              </a:xfrm>
+              <a:prstGeom prst="rect">
+                <a:avLst/>
+              </a:prstGeom>
+              <a:blipFill>
+                <a:blip r:embed="rId2"/>
+                <a:stretch>
+                  <a:fillRect l="-419" t="-3289" b="-9211"/>
+                </a:stretch>
+              </a:blipFill>
+            </p:spPr>
+            <p:txBody>
+              <a:bodyPr/>
+              <a:lstStyle/>
+              <a:p>
+                <a:r>
+                  <a:rPr lang="en-US">
+                    <a:noFill/>
+                  </a:rPr>
+                  <a:t> </a:t>
+                </a:r>
+              </a:p>
+            </p:txBody>
+          </p:sp>
+        </mc:Fallback>
+      </mc:AlternateContent>
+      <p:pic>
+        <p:nvPicPr>
+          <p:cNvPr id="7" name="Picture 6">
+            <a:extLst>
+              <a:ext uri="{FF2B5EF4-FFF2-40B4-BE49-F238E27FC236}">
+                <a16:creationId xmlns:a16="http://schemas.microsoft.com/office/drawing/2014/main" id="{C50924F7-0C8E-E62F-D40C-9E91ECEEBFB1}"/>
+              </a:ext>
+            </a:extLst>
+          </p:cNvPr>
+          <p:cNvPicPr>
+            <a:picLocks noChangeAspect="1"/>
+          </p:cNvPicPr>
+          <p:nvPr/>
+        </p:nvPicPr>
+        <p:blipFill>
+          <a:blip r:embed="rId3"/>
+          <a:stretch>
+            <a:fillRect/>
+          </a:stretch>
+        </p:blipFill>
+        <p:spPr>
+          <a:xfrm>
+            <a:off x="217057" y="1889245"/>
+            <a:ext cx="10573029" cy="923330"/>
+          </a:xfrm>
+          <a:prstGeom prst="rect">
+            <a:avLst/>
+          </a:prstGeom>
+        </p:spPr>
+      </p:pic>
+      <p:pic>
+        <p:nvPicPr>
+          <p:cNvPr id="9" name="Picture 8">
+            <a:extLst>
+              <a:ext uri="{FF2B5EF4-FFF2-40B4-BE49-F238E27FC236}">
+                <a16:creationId xmlns:a16="http://schemas.microsoft.com/office/drawing/2014/main" id="{78F718B8-E8E1-F48D-B067-2D2328F72419}"/>
+              </a:ext>
+            </a:extLst>
+          </p:cNvPr>
+          <p:cNvPicPr>
+            <a:picLocks noChangeAspect="1"/>
+          </p:cNvPicPr>
+          <p:nvPr/>
+        </p:nvPicPr>
+        <p:blipFill>
+          <a:blip r:embed="rId4"/>
+          <a:stretch>
+            <a:fillRect/>
+          </a:stretch>
+        </p:blipFill>
+        <p:spPr>
+          <a:xfrm>
+            <a:off x="217057" y="3097370"/>
+            <a:ext cx="8739068" cy="887927"/>
+          </a:xfrm>
+          <a:prstGeom prst="rect">
+            <a:avLst/>
+          </a:prstGeom>
+        </p:spPr>
+      </p:pic>
+    </p:spTree>
+    <p:extLst>
+      <p:ext uri="{BB962C8B-B14F-4D97-AF65-F5344CB8AC3E}">
+        <p14:creationId xmlns:p14="http://schemas.microsoft.com/office/powerpoint/2010/main" val="4055838819"/>
+      </p:ext>
+    </p:extLst>
+  </p:cSld>
+  <p:clrMapOvr>
+    <a:masterClrMapping/>
+  </p:clrMapOvr>
+</p:sld>
+</file>
+
+<file path=ppt/slides/slide12.xml><?xml version="1.0" encoding="utf-8"?>
+<p:sld xmlns:a="http://schemas.openxmlformats.org/drawingml/2006/main" xmlns:r="http://schemas.openxmlformats.org/officeDocument/2006/relationships" xmlns:p="http://schemas.openxmlformats.org/presentationml/2006/main">
+  <p:cSld>
+    <p:spTree>
+      <p:nvGrpSpPr>
+        <p:cNvPr id="1" name=""/>
+        <p:cNvGrpSpPr/>
+        <p:nvPr/>
+      </p:nvGrpSpPr>
+      <p:grpSpPr>
+        <a:xfrm>
+          <a:off x="0" y="0"/>
+          <a:ext cx="0" cy="0"/>
+          <a:chOff x="0" y="0"/>
+          <a:chExt cx="0" cy="0"/>
+        </a:xfrm>
+      </p:grpSpPr>
+      <p:sp>
+        <p:nvSpPr>
+          <p:cNvPr id="4" name="Title 1">
+            <a:extLst>
+              <a:ext uri="{FF2B5EF4-FFF2-40B4-BE49-F238E27FC236}">
+                <a16:creationId xmlns:a16="http://schemas.microsoft.com/office/drawing/2014/main" id="{7EBB5AC3-7B56-F4DD-445F-E6A1977104A1}"/>
+              </a:ext>
+            </a:extLst>
+          </p:cNvPr>
+          <p:cNvSpPr txBox="1">
+            <a:spLocks/>
+          </p:cNvSpPr>
+          <p:nvPr/>
+        </p:nvSpPr>
+        <p:spPr>
+          <a:xfrm>
+            <a:off x="245772" y="262095"/>
+            <a:ext cx="10515600" cy="356092"/>
+          </a:xfrm>
+          <a:prstGeom prst="rect">
+            <a:avLst/>
+          </a:prstGeom>
+        </p:spPr>
+        <p:txBody>
+          <a:bodyPr vert="horz" lIns="91440" tIns="45720" rIns="91440" bIns="45720" rtlCol="0" anchor="ctr">
+            <a:noAutofit/>
+          </a:bodyPr>
+          <a:lstStyle>
+            <a:lvl1pPr algn="l" defTabSz="914400" rtl="0" eaLnBrk="1" latinLnBrk="0" hangingPunct="1">
+              <a:lnSpc>
+                <a:spcPct val="90000"/>
+              </a:lnSpc>
+              <a:spcBef>
+                <a:spcPct val="0"/>
+              </a:spcBef>
+              <a:buNone/>
+              <a:defRPr sz="4400" kern="1200">
+                <a:solidFill>
+                  <a:schemeClr val="tx1"/>
+                </a:solidFill>
+                <a:latin typeface="+mj-lt"/>
+                <a:ea typeface="+mj-ea"/>
+                <a:cs typeface="+mj-cs"/>
+              </a:defRPr>
+            </a:lvl1pPr>
+          </a:lstStyle>
+          <a:p>
+            <a:r>
+              <a:rPr lang="en-US" sz="3200" dirty="0"/>
+              <a:t>Push commit files to remote git host</a:t>
+            </a:r>
+          </a:p>
+        </p:txBody>
+      </p:sp>
+      <p:pic>
+        <p:nvPicPr>
+          <p:cNvPr id="7" name="Picture 6">
+            <a:extLst>
+              <a:ext uri="{FF2B5EF4-FFF2-40B4-BE49-F238E27FC236}">
+                <a16:creationId xmlns:a16="http://schemas.microsoft.com/office/drawing/2014/main" id="{CB7271CA-56D8-A969-EBBA-7A40A2337191}"/>
+              </a:ext>
+            </a:extLst>
+          </p:cNvPr>
+          <p:cNvPicPr>
+            <a:picLocks noChangeAspect="1"/>
+          </p:cNvPicPr>
+          <p:nvPr/>
+        </p:nvPicPr>
+        <p:blipFill>
+          <a:blip r:embed="rId2"/>
+          <a:stretch>
+            <a:fillRect/>
+          </a:stretch>
+        </p:blipFill>
+        <p:spPr>
+          <a:xfrm>
+            <a:off x="245772" y="850624"/>
+            <a:ext cx="9225492" cy="2897128"/>
+          </a:xfrm>
+          <a:prstGeom prst="rect">
+            <a:avLst/>
+          </a:prstGeom>
+        </p:spPr>
+      </p:pic>
+    </p:spTree>
+    <p:extLst>
+      <p:ext uri="{BB962C8B-B14F-4D97-AF65-F5344CB8AC3E}">
+        <p14:creationId xmlns:p14="http://schemas.microsoft.com/office/powerpoint/2010/main" val="1043921148"/>
+      </p:ext>
+    </p:extLst>
+  </p:cSld>
+  <p:clrMapOvr>
+    <a:masterClrMapping/>
+  </p:clrMapOvr>
+</p:sld>
+</file>
+
 <file path=ppt/slides/slide2.xml><?xml version="1.0" encoding="utf-8"?>
 <p:sld xmlns:a="http://schemas.openxmlformats.org/drawingml/2006/main" xmlns:r="http://schemas.openxmlformats.org/officeDocument/2006/relationships" xmlns:p="http://schemas.openxmlformats.org/presentationml/2006/main">
   <p:cSld>
@@ -4127,20 +4953,1352 @@
           <a:p>
             <a:r>
               <a:rPr lang="en-US" sz="3200" dirty="0"/>
-              <a:t>Add files </a:t>
-            </a:r>
-            <a:r>
-              <a:rPr lang="en-US" sz="3200"/>
-              <a:t>to git</a:t>
-            </a:r>
-            <a:endParaRPr lang="en-US" sz="3200" dirty="0"/>
-          </a:p>
-        </p:txBody>
-      </p:sp>
+              <a:t>Add files to git</a:t>
+            </a:r>
+          </a:p>
+        </p:txBody>
+      </p:sp>
+      <p:pic>
+        <p:nvPicPr>
+          <p:cNvPr id="6" name="Picture 5">
+            <a:extLst>
+              <a:ext uri="{FF2B5EF4-FFF2-40B4-BE49-F238E27FC236}">
+                <a16:creationId xmlns:a16="http://schemas.microsoft.com/office/drawing/2014/main" id="{E3D92EC3-0A59-1FFB-D87F-15FCE5F34F88}"/>
+              </a:ext>
+            </a:extLst>
+          </p:cNvPr>
+          <p:cNvPicPr>
+            <a:picLocks noChangeAspect="1"/>
+          </p:cNvPicPr>
+          <p:nvPr/>
+        </p:nvPicPr>
+        <p:blipFill>
+          <a:blip r:embed="rId2"/>
+          <a:stretch>
+            <a:fillRect/>
+          </a:stretch>
+        </p:blipFill>
+        <p:spPr>
+          <a:xfrm>
+            <a:off x="245771" y="748913"/>
+            <a:ext cx="7327005" cy="5902947"/>
+          </a:xfrm>
+          <a:prstGeom prst="rect">
+            <a:avLst/>
+          </a:prstGeom>
+        </p:spPr>
+      </p:pic>
+      <mc:AlternateContent xmlns:mc="http://schemas.openxmlformats.org/markup-compatibility/2006">
+        <mc:Choice xmlns:a14="http://schemas.microsoft.com/office/drawing/2010/main" Requires="a14">
+          <p:sp>
+            <p:nvSpPr>
+              <p:cNvPr id="7" name="TextBox 6">
+                <a:extLst>
+                  <a:ext uri="{FF2B5EF4-FFF2-40B4-BE49-F238E27FC236}">
+                    <a16:creationId xmlns:a16="http://schemas.microsoft.com/office/drawing/2014/main" id="{A70E1C4D-9CB3-0B3B-A1FB-C69A8D1FEA20}"/>
+                  </a:ext>
+                </a:extLst>
+              </p:cNvPr>
+              <p:cNvSpPr txBox="1"/>
+              <p:nvPr/>
+            </p:nvSpPr>
+            <p:spPr>
+              <a:xfrm>
+                <a:off x="7778839" y="748913"/>
+                <a:ext cx="4167390" cy="3970318"/>
+              </a:xfrm>
+              <a:prstGeom prst="rect">
+                <a:avLst/>
+              </a:prstGeom>
+              <a:noFill/>
+            </p:spPr>
+            <p:txBody>
+              <a:bodyPr wrap="square" rtlCol="0">
+                <a:spAutoFit/>
+              </a:bodyPr>
+              <a:lstStyle/>
+              <a:p>
+                <a:pPr marL="285750" indent="-285750">
+                  <a:buFont typeface="Arial" panose="020B0604020202020204" pitchFamily="34" charset="0"/>
+                  <a:buChar char="•"/>
+                </a:pPr>
+                <a14:m>
+                  <m:oMath xmlns:m="http://schemas.openxmlformats.org/officeDocument/2006/math">
+                    <m:r>
+                      <a:rPr lang="en-US" b="0" i="1" smtClean="0">
+                        <a:latin typeface="Cambria Math" panose="02040503050406030204" pitchFamily="18" charset="0"/>
+                      </a:rPr>
+                      <m:t>𝑔𝑖𝑡</m:t>
+                    </m:r>
+                    <m:r>
+                      <a:rPr lang="en-US" b="0" i="1" smtClean="0">
+                        <a:latin typeface="Cambria Math" panose="02040503050406030204" pitchFamily="18" charset="0"/>
+                      </a:rPr>
+                      <m:t> </m:t>
+                    </m:r>
+                    <m:r>
+                      <a:rPr lang="en-US" b="0" i="1" smtClean="0">
+                        <a:latin typeface="Cambria Math" panose="02040503050406030204" pitchFamily="18" charset="0"/>
+                      </a:rPr>
+                      <m:t>𝑎𝑑𝑑</m:t>
+                    </m:r>
+                    <m:r>
+                      <a:rPr lang="en-US" b="0" i="1" smtClean="0">
+                        <a:latin typeface="Cambria Math" panose="02040503050406030204" pitchFamily="18" charset="0"/>
+                      </a:rPr>
+                      <m:t> &lt;</m:t>
+                    </m:r>
+                    <m:r>
+                      <a:rPr lang="en-US" b="0" i="1" smtClean="0">
+                        <a:latin typeface="Cambria Math" panose="02040503050406030204" pitchFamily="18" charset="0"/>
+                      </a:rPr>
+                      <m:t>𝑓𝑖𝑙𝑒𝑛𝑎𝑚</m:t>
+                    </m:r>
+                    <m:r>
+                      <a:rPr lang="en-US" b="0" i="1" spc="-300" smtClean="0">
+                        <a:latin typeface="Cambria Math" panose="02040503050406030204" pitchFamily="18" charset="0"/>
+                      </a:rPr>
+                      <m:t>𝑒</m:t>
+                    </m:r>
+                    <m:r>
+                      <a:rPr lang="en-US" b="0" i="1" spc="-300" smtClean="0">
+                        <a:latin typeface="Cambria Math" panose="02040503050406030204" pitchFamily="18" charset="0"/>
+                      </a:rPr>
+                      <m:t>&gt;</m:t>
+                    </m:r>
+                  </m:oMath>
+                </a14:m>
+                <a:r>
+                  <a:rPr lang="en-US" dirty="0"/>
+                  <a:t>  adds the file to the staging area.</a:t>
+                </a:r>
+              </a:p>
+              <a:p>
+                <a:pPr marL="285750" indent="-285750">
+                  <a:buFont typeface="Arial" panose="020B0604020202020204" pitchFamily="34" charset="0"/>
+                  <a:buChar char="•"/>
+                </a:pPr>
+                <a:r>
+                  <a:rPr lang="en-US" dirty="0"/>
+                  <a:t>To check the status of files in staging area, run the </a:t>
+                </a:r>
+                <a14:m>
+                  <m:oMath xmlns:m="http://schemas.openxmlformats.org/officeDocument/2006/math">
+                    <m:r>
+                      <a:rPr lang="en-US" b="0" i="0" smtClean="0">
+                        <a:latin typeface="Cambria Math" panose="02040503050406030204" pitchFamily="18" charset="0"/>
+                      </a:rPr>
+                      <m:t>$ </m:t>
+                    </m:r>
+                    <m:r>
+                      <a:rPr lang="en-US" b="0" i="1" smtClean="0">
+                        <a:latin typeface="Cambria Math" panose="02040503050406030204" pitchFamily="18" charset="0"/>
+                      </a:rPr>
+                      <m:t>𝑔𝑖𝑡</m:t>
+                    </m:r>
+                    <m:r>
+                      <a:rPr lang="en-US" b="0" i="1" smtClean="0">
+                        <a:latin typeface="Cambria Math" panose="02040503050406030204" pitchFamily="18" charset="0"/>
+                      </a:rPr>
+                      <m:t> </m:t>
+                    </m:r>
+                    <m:r>
+                      <a:rPr lang="en-US" b="0" i="1" smtClean="0">
+                        <a:latin typeface="Cambria Math" panose="02040503050406030204" pitchFamily="18" charset="0"/>
+                      </a:rPr>
+                      <m:t>𝑠𝑡𝑎𝑡𝑢𝑠</m:t>
+                    </m:r>
+                  </m:oMath>
+                </a14:m>
+                <a:r>
+                  <a:rPr lang="en-US" dirty="0"/>
+                  <a:t> command.</a:t>
+                </a:r>
+              </a:p>
+              <a:p>
+                <a:pPr marL="285750" indent="-285750">
+                  <a:buFont typeface="Arial" panose="020B0604020202020204" pitchFamily="34" charset="0"/>
+                  <a:buChar char="•"/>
+                </a:pPr>
+                <a:r>
+                  <a:rPr lang="en-US" dirty="0"/>
+                  <a:t>To remove a file from the staging area, run </a:t>
+                </a:r>
+                <a14:m>
+                  <m:oMath xmlns:m="http://schemas.openxmlformats.org/officeDocument/2006/math">
+                    <m:r>
+                      <a:rPr lang="en-US" b="0" i="1" smtClean="0">
+                        <a:latin typeface="Cambria Math" panose="02040503050406030204" pitchFamily="18" charset="0"/>
+                      </a:rPr>
+                      <m:t>𝑔𝑖𝑡</m:t>
+                    </m:r>
+                    <m:r>
+                      <a:rPr lang="en-US" b="0" i="1" smtClean="0">
+                        <a:latin typeface="Cambria Math" panose="02040503050406030204" pitchFamily="18" charset="0"/>
+                      </a:rPr>
+                      <m:t> </m:t>
+                    </m:r>
+                    <m:r>
+                      <a:rPr lang="en-US" b="0" i="1" smtClean="0">
+                        <a:latin typeface="Cambria Math" panose="02040503050406030204" pitchFamily="18" charset="0"/>
+                      </a:rPr>
+                      <m:t>𝑟𝑚</m:t>
+                    </m:r>
+                    <m:r>
+                      <a:rPr lang="en-US" b="0" i="1" smtClean="0">
+                        <a:latin typeface="Cambria Math" panose="02040503050406030204" pitchFamily="18" charset="0"/>
+                      </a:rPr>
+                      <m:t> −−</m:t>
+                    </m:r>
+                    <m:r>
+                      <a:rPr lang="en-US" b="0" i="1" smtClean="0">
+                        <a:latin typeface="Cambria Math" panose="02040503050406030204" pitchFamily="18" charset="0"/>
+                      </a:rPr>
+                      <m:t>𝑐𝑎𝑐h𝑒𝑑</m:t>
+                    </m:r>
+                    <m:r>
+                      <a:rPr lang="en-US" b="0" i="1" smtClean="0">
+                        <a:latin typeface="Cambria Math" panose="02040503050406030204" pitchFamily="18" charset="0"/>
+                      </a:rPr>
+                      <m:t> &lt;</m:t>
+                    </m:r>
+                    <m:r>
+                      <a:rPr lang="en-US" b="0" i="1" spc="-150" smtClean="0">
+                        <a:latin typeface="Cambria Math" panose="02040503050406030204" pitchFamily="18" charset="0"/>
+                      </a:rPr>
+                      <m:t>𝑓𝑖𝑙𝑒𝑛𝑎𝑚𝑒</m:t>
+                    </m:r>
+                    <m:r>
+                      <a:rPr lang="en-US" b="0" i="1" spc="-150" smtClean="0">
+                        <a:latin typeface="Cambria Math" panose="02040503050406030204" pitchFamily="18" charset="0"/>
+                      </a:rPr>
+                      <m:t>&gt; </m:t>
+                    </m:r>
+                  </m:oMath>
+                </a14:m>
+                <a:endParaRPr lang="en-US" b="0" dirty="0"/>
+              </a:p>
+              <a:p>
+                <a:pPr marL="285750" indent="-285750">
+                  <a:buFont typeface="Arial" panose="020B0604020202020204" pitchFamily="34" charset="0"/>
+                  <a:buChar char="•"/>
+                </a:pPr>
+                <a:endParaRPr lang="en-US" dirty="0"/>
+              </a:p>
+              <a:p>
+                <a:pPr marL="285750" indent="-285750">
+                  <a:buFont typeface="Arial" panose="020B0604020202020204" pitchFamily="34" charset="0"/>
+                  <a:buChar char="•"/>
+                </a:pPr>
+                <a:endParaRPr lang="en-US" dirty="0"/>
+              </a:p>
+              <a:p>
+                <a:pPr marL="285750" indent="-285750">
+                  <a:buFont typeface="Arial" panose="020B0604020202020204" pitchFamily="34" charset="0"/>
+                  <a:buChar char="•"/>
+                </a:pPr>
+                <a14:m>
+                  <m:oMath xmlns:m="http://schemas.openxmlformats.org/officeDocument/2006/math">
+                    <m:r>
+                      <a:rPr lang="en-US" b="0" i="1" smtClean="0">
+                        <a:latin typeface="Cambria Math" panose="02040503050406030204" pitchFamily="18" charset="0"/>
+                      </a:rPr>
+                      <m:t>𝑔𝑖𝑡</m:t>
+                    </m:r>
+                    <m:r>
+                      <a:rPr lang="en-US" b="0" i="1" smtClean="0">
+                        <a:latin typeface="Cambria Math" panose="02040503050406030204" pitchFamily="18" charset="0"/>
+                      </a:rPr>
+                      <m:t> </m:t>
+                    </m:r>
+                    <m:r>
+                      <a:rPr lang="en-US" b="0" i="1" smtClean="0">
+                        <a:latin typeface="Cambria Math" panose="02040503050406030204" pitchFamily="18" charset="0"/>
+                      </a:rPr>
+                      <m:t>𝑎𝑑𝑑</m:t>
+                    </m:r>
+                    <m:r>
+                      <a:rPr lang="en-US" b="0" i="1" smtClean="0">
+                        <a:latin typeface="Cambria Math" panose="02040503050406030204" pitchFamily="18" charset="0"/>
+                      </a:rPr>
+                      <m:t> ∗.</m:t>
+                    </m:r>
+                    <m:r>
+                      <a:rPr lang="en-US" b="0" i="1" smtClean="0">
+                        <a:latin typeface="Cambria Math" panose="02040503050406030204" pitchFamily="18" charset="0"/>
+                      </a:rPr>
+                      <m:t>𝑐𝑝𝑝</m:t>
+                    </m:r>
+                    <m:r>
+                      <a:rPr lang="en-US" b="0" i="1" smtClean="0">
+                        <a:latin typeface="Cambria Math" panose="02040503050406030204" pitchFamily="18" charset="0"/>
+                      </a:rPr>
+                      <m:t> </m:t>
+                    </m:r>
+                  </m:oMath>
+                </a14:m>
+                <a:br>
+                  <a:rPr lang="en-US" dirty="0"/>
+                </a:br>
+                <a:r>
+                  <a:rPr lang="en-US" dirty="0"/>
+                  <a:t>this will add all the .</a:t>
+                </a:r>
+                <a:r>
+                  <a:rPr lang="en-US" dirty="0" err="1"/>
+                  <a:t>cpp</a:t>
+                </a:r>
+                <a:r>
+                  <a:rPr lang="en-US" dirty="0"/>
+                  <a:t> files to the staging area.</a:t>
+                </a:r>
+              </a:p>
+              <a:p>
+                <a:pPr marL="285750" indent="-285750">
+                  <a:buFont typeface="Arial" panose="020B0604020202020204" pitchFamily="34" charset="0"/>
+                  <a:buChar char="•"/>
+                </a:pPr>
+                <a14:m>
+                  <m:oMath xmlns:m="http://schemas.openxmlformats.org/officeDocument/2006/math">
+                    <m:r>
+                      <a:rPr lang="en-US" b="0" i="1" smtClean="0">
+                        <a:latin typeface="Cambria Math" panose="02040503050406030204" pitchFamily="18" charset="0"/>
+                      </a:rPr>
+                      <m:t>𝑔𝑖𝑡</m:t>
+                    </m:r>
+                    <m:r>
+                      <a:rPr lang="en-US" b="0" i="1" smtClean="0">
+                        <a:latin typeface="Cambria Math" panose="02040503050406030204" pitchFamily="18" charset="0"/>
+                      </a:rPr>
+                      <m:t> </m:t>
+                    </m:r>
+                    <m:r>
+                      <a:rPr lang="en-US" b="0" i="1" smtClean="0">
+                        <a:latin typeface="Cambria Math" panose="02040503050406030204" pitchFamily="18" charset="0"/>
+                      </a:rPr>
+                      <m:t>𝑎𝑑𝑑</m:t>
+                    </m:r>
+                    <m:r>
+                      <a:rPr lang="en-US" b="0" i="1" smtClean="0">
+                        <a:latin typeface="Cambria Math" panose="02040503050406030204" pitchFamily="18" charset="0"/>
+                      </a:rPr>
+                      <m:t> .</m:t>
+                    </m:r>
+                  </m:oMath>
+                </a14:m>
+                <a:br>
+                  <a:rPr lang="en-US" dirty="0"/>
+                </a:br>
+                <a:r>
+                  <a:rPr lang="en-US" dirty="0"/>
+                  <a:t>This will add all the files to the staging area.</a:t>
+                </a:r>
+              </a:p>
+            </p:txBody>
+          </p:sp>
+        </mc:Choice>
+        <mc:Fallback>
+          <p:sp>
+            <p:nvSpPr>
+              <p:cNvPr id="7" name="TextBox 6">
+                <a:extLst>
+                  <a:ext uri="{FF2B5EF4-FFF2-40B4-BE49-F238E27FC236}">
+                    <a16:creationId xmlns:a16="http://schemas.microsoft.com/office/drawing/2014/main" id="{A70E1C4D-9CB3-0B3B-A1FB-C69A8D1FEA20}"/>
+                  </a:ext>
+                </a:extLst>
+              </p:cNvPr>
+              <p:cNvSpPr txBox="1">
+                <a:spLocks noRot="1" noChangeAspect="1" noMove="1" noResize="1" noEditPoints="1" noAdjustHandles="1" noChangeArrowheads="1" noChangeShapeType="1" noTextEdit="1"/>
+              </p:cNvSpPr>
+              <p:nvPr/>
+            </p:nvSpPr>
+            <p:spPr>
+              <a:xfrm>
+                <a:off x="7778839" y="748913"/>
+                <a:ext cx="4167390" cy="3970318"/>
+              </a:xfrm>
+              <a:prstGeom prst="rect">
+                <a:avLst/>
+              </a:prstGeom>
+              <a:blipFill>
+                <a:blip r:embed="rId3"/>
+                <a:stretch>
+                  <a:fillRect l="-877" t="-922" b="-1536"/>
+                </a:stretch>
+              </a:blipFill>
+            </p:spPr>
+            <p:txBody>
+              <a:bodyPr/>
+              <a:lstStyle/>
+              <a:p>
+                <a:r>
+                  <a:rPr lang="en-US">
+                    <a:noFill/>
+                  </a:rPr>
+                  <a:t> </a:t>
+                </a:r>
+              </a:p>
+            </p:txBody>
+          </p:sp>
+        </mc:Fallback>
+      </mc:AlternateContent>
     </p:spTree>
     <p:extLst>
       <p:ext uri="{BB962C8B-B14F-4D97-AF65-F5344CB8AC3E}">
         <p14:creationId xmlns:p14="http://schemas.microsoft.com/office/powerpoint/2010/main" val="1761890103"/>
+      </p:ext>
+    </p:extLst>
+  </p:cSld>
+  <p:clrMapOvr>
+    <a:masterClrMapping/>
+  </p:clrMapOvr>
+</p:sld>
+</file>
+
+<file path=ppt/slides/slide7.xml><?xml version="1.0" encoding="utf-8"?>
+<p:sld xmlns:a="http://schemas.openxmlformats.org/drawingml/2006/main" xmlns:r="http://schemas.openxmlformats.org/officeDocument/2006/relationships" xmlns:p="http://schemas.openxmlformats.org/presentationml/2006/main">
+  <p:cSld>
+    <p:spTree>
+      <p:nvGrpSpPr>
+        <p:cNvPr id="1" name=""/>
+        <p:cNvGrpSpPr/>
+        <p:nvPr/>
+      </p:nvGrpSpPr>
+      <p:grpSpPr>
+        <a:xfrm>
+          <a:off x="0" y="0"/>
+          <a:ext cx="0" cy="0"/>
+          <a:chOff x="0" y="0"/>
+          <a:chExt cx="0" cy="0"/>
+        </a:xfrm>
+      </p:grpSpPr>
+      <p:sp>
+        <p:nvSpPr>
+          <p:cNvPr id="4" name="Title 1">
+            <a:extLst>
+              <a:ext uri="{FF2B5EF4-FFF2-40B4-BE49-F238E27FC236}">
+                <a16:creationId xmlns:a16="http://schemas.microsoft.com/office/drawing/2014/main" id="{2DE504AE-D244-522D-F8D3-CBA3DC77F93C}"/>
+              </a:ext>
+            </a:extLst>
+          </p:cNvPr>
+          <p:cNvSpPr txBox="1">
+            <a:spLocks/>
+          </p:cNvSpPr>
+          <p:nvPr/>
+        </p:nvSpPr>
+        <p:spPr>
+          <a:xfrm>
+            <a:off x="245772" y="262095"/>
+            <a:ext cx="10515600" cy="356092"/>
+          </a:xfrm>
+          <a:prstGeom prst="rect">
+            <a:avLst/>
+          </a:prstGeom>
+        </p:spPr>
+        <p:txBody>
+          <a:bodyPr vert="horz" lIns="91440" tIns="45720" rIns="91440" bIns="45720" rtlCol="0" anchor="ctr">
+            <a:noAutofit/>
+          </a:bodyPr>
+          <a:lstStyle>
+            <a:lvl1pPr algn="l" defTabSz="914400" rtl="0" eaLnBrk="1" latinLnBrk="0" hangingPunct="1">
+              <a:lnSpc>
+                <a:spcPct val="90000"/>
+              </a:lnSpc>
+              <a:spcBef>
+                <a:spcPct val="0"/>
+              </a:spcBef>
+              <a:buNone/>
+              <a:defRPr sz="4400" kern="1200">
+                <a:solidFill>
+                  <a:schemeClr val="tx1"/>
+                </a:solidFill>
+                <a:latin typeface="+mj-lt"/>
+                <a:ea typeface="+mj-ea"/>
+                <a:cs typeface="+mj-cs"/>
+              </a:defRPr>
+            </a:lvl1pPr>
+          </a:lstStyle>
+          <a:p>
+            <a:r>
+              <a:rPr lang="en-US" sz="3200" dirty="0"/>
+              <a:t>Committing file to git</a:t>
+            </a:r>
+          </a:p>
+        </p:txBody>
+      </p:sp>
+      <p:pic>
+        <p:nvPicPr>
+          <p:cNvPr id="6" name="Picture 5">
+            <a:extLst>
+              <a:ext uri="{FF2B5EF4-FFF2-40B4-BE49-F238E27FC236}">
+                <a16:creationId xmlns:a16="http://schemas.microsoft.com/office/drawing/2014/main" id="{E4D1B947-8D27-BA7C-2E49-51BA8DC8FE6D}"/>
+              </a:ext>
+            </a:extLst>
+          </p:cNvPr>
+          <p:cNvPicPr>
+            <a:picLocks noChangeAspect="1"/>
+          </p:cNvPicPr>
+          <p:nvPr/>
+        </p:nvPicPr>
+        <p:blipFill>
+          <a:blip r:embed="rId2"/>
+          <a:stretch>
+            <a:fillRect/>
+          </a:stretch>
+        </p:blipFill>
+        <p:spPr>
+          <a:xfrm>
+            <a:off x="245772" y="796673"/>
+            <a:ext cx="8592892" cy="4728364"/>
+          </a:xfrm>
+          <a:prstGeom prst="rect">
+            <a:avLst/>
+          </a:prstGeom>
+        </p:spPr>
+      </p:pic>
+      <mc:AlternateContent xmlns:mc="http://schemas.openxmlformats.org/markup-compatibility/2006">
+        <mc:Choice xmlns:a14="http://schemas.microsoft.com/office/drawing/2010/main" Requires="a14">
+          <p:sp>
+            <p:nvSpPr>
+              <p:cNvPr id="7" name="TextBox 6">
+                <a:extLst>
+                  <a:ext uri="{FF2B5EF4-FFF2-40B4-BE49-F238E27FC236}">
+                    <a16:creationId xmlns:a16="http://schemas.microsoft.com/office/drawing/2014/main" id="{34E7E516-55F9-0239-3066-30A41C6B5529}"/>
+                  </a:ext>
+                </a:extLst>
+              </p:cNvPr>
+              <p:cNvSpPr txBox="1"/>
+              <p:nvPr/>
+            </p:nvSpPr>
+            <p:spPr>
+              <a:xfrm>
+                <a:off x="245772" y="5731099"/>
+                <a:ext cx="11680065" cy="378180"/>
+              </a:xfrm>
+              <a:prstGeom prst="rect">
+                <a:avLst/>
+              </a:prstGeom>
+              <a:noFill/>
+            </p:spPr>
+            <p:txBody>
+              <a:bodyPr wrap="square" rtlCol="0">
+                <a:spAutoFit/>
+              </a:bodyPr>
+              <a:lstStyle/>
+              <a:p>
+                <a:r>
+                  <a:rPr lang="en-US" dirty="0"/>
+                  <a:t>Run </a:t>
+                </a:r>
+                <a14:m>
+                  <m:oMath xmlns:m="http://schemas.openxmlformats.org/officeDocument/2006/math">
+                    <m:r>
+                      <a:rPr lang="en-US" b="0" i="1" smtClean="0">
+                        <a:latin typeface="Cambria Math" panose="02040503050406030204" pitchFamily="18" charset="0"/>
+                      </a:rPr>
+                      <m:t>$ </m:t>
+                    </m:r>
+                    <m:r>
+                      <a:rPr lang="en-US" b="0" i="1" smtClean="0">
+                        <a:latin typeface="Cambria Math" panose="02040503050406030204" pitchFamily="18" charset="0"/>
+                      </a:rPr>
+                      <m:t>𝑔𝑖𝑡</m:t>
+                    </m:r>
+                    <m:r>
+                      <a:rPr lang="en-US" b="0" i="1" smtClean="0">
+                        <a:latin typeface="Cambria Math" panose="02040503050406030204" pitchFamily="18" charset="0"/>
+                      </a:rPr>
+                      <m:t> </m:t>
+                    </m:r>
+                    <m:r>
+                      <a:rPr lang="en-US" b="0" i="1" smtClean="0">
+                        <a:latin typeface="Cambria Math" panose="02040503050406030204" pitchFamily="18" charset="0"/>
+                      </a:rPr>
+                      <m:t>𝑐𝑜𝑚𝑚𝑖𝑡</m:t>
+                    </m:r>
+                    <m:r>
+                      <a:rPr lang="en-US" b="0" i="1" smtClean="0">
+                        <a:latin typeface="Cambria Math" panose="02040503050406030204" pitchFamily="18" charset="0"/>
+                      </a:rPr>
+                      <m:t> −</m:t>
+                    </m:r>
+                    <m:r>
+                      <a:rPr lang="en-US" b="0" i="1" smtClean="0">
+                        <a:latin typeface="Cambria Math" panose="02040503050406030204" pitchFamily="18" charset="0"/>
+                      </a:rPr>
+                      <m:t>𝑚</m:t>
+                    </m:r>
+                    <m:sPre>
+                      <m:sPrePr>
+                        <m:ctrlPr>
+                          <a:rPr lang="en-US" b="0" i="1" smtClean="0">
+                            <a:latin typeface="Cambria Math" panose="02040503050406030204" pitchFamily="18" charset="0"/>
+                          </a:rPr>
+                        </m:ctrlPr>
+                      </m:sPrePr>
+                      <m:sub/>
+                      <m:sup>
+                        <m:r>
+                          <a:rPr lang="en-US" b="0" i="1" smtClean="0">
+                            <a:latin typeface="Cambria Math" panose="02040503050406030204" pitchFamily="18" charset="0"/>
+                          </a:rPr>
+                          <m:t>′</m:t>
+                        </m:r>
+                      </m:sup>
+                      <m:e>
+                        <m:r>
+                          <a:rPr lang="en-US" b="0" i="1" smtClean="0">
+                            <a:latin typeface="Cambria Math" panose="02040503050406030204" pitchFamily="18" charset="0"/>
+                          </a:rPr>
+                          <m:t>&lt;</m:t>
+                        </m:r>
+                        <m:r>
+                          <a:rPr lang="en-US" b="0" i="1" smtClean="0">
+                            <a:latin typeface="Cambria Math" panose="02040503050406030204" pitchFamily="18" charset="0"/>
+                          </a:rPr>
+                          <m:t>𝑜</m:t>
+                        </m:r>
+                      </m:e>
+                    </m:sPre>
+                    <m:r>
+                      <a:rPr lang="en-US" b="0" i="1" smtClean="0">
+                        <a:latin typeface="Cambria Math" panose="02040503050406030204" pitchFamily="18" charset="0"/>
+                      </a:rPr>
+                      <m:t>𝑢𝑟</m:t>
+                    </m:r>
+                    <m:r>
+                      <a:rPr lang="en-US" b="0" i="1" smtClean="0">
+                        <a:latin typeface="Cambria Math" panose="02040503050406030204" pitchFamily="18" charset="0"/>
+                      </a:rPr>
+                      <m:t> </m:t>
+                    </m:r>
+                    <m:r>
+                      <a:rPr lang="en-US" b="0" i="1" smtClean="0">
+                        <a:latin typeface="Cambria Math" panose="02040503050406030204" pitchFamily="18" charset="0"/>
+                      </a:rPr>
+                      <m:t>𝑚𝑒𝑠𝑠𝑎𝑔𝑒</m:t>
+                    </m:r>
+                    <m:r>
+                      <a:rPr lang="en-US" b="0" i="1" smtClean="0">
+                        <a:latin typeface="Cambria Math" panose="02040503050406030204" pitchFamily="18" charset="0"/>
+                      </a:rPr>
+                      <m:t> </m:t>
+                    </m:r>
+                    <m:r>
+                      <a:rPr lang="en-US" b="0" i="1" smtClean="0">
+                        <a:latin typeface="Cambria Math" panose="02040503050406030204" pitchFamily="18" charset="0"/>
+                      </a:rPr>
+                      <m:t>𝑓𝑜𝑟</m:t>
+                    </m:r>
+                    <m:r>
+                      <a:rPr lang="en-US" b="0" i="1" smtClean="0">
+                        <a:latin typeface="Cambria Math" panose="02040503050406030204" pitchFamily="18" charset="0"/>
+                      </a:rPr>
+                      <m:t> </m:t>
+                    </m:r>
+                    <m:r>
+                      <a:rPr lang="en-US" b="0" i="1" smtClean="0">
+                        <a:latin typeface="Cambria Math" panose="02040503050406030204" pitchFamily="18" charset="0"/>
+                      </a:rPr>
+                      <m:t>𝑐𝑜𝑚𝑚𝑖𝑡</m:t>
+                    </m:r>
+                    <m:r>
+                      <a:rPr lang="en-US" b="0" i="1" smtClean="0">
+                        <a:latin typeface="Cambria Math" panose="02040503050406030204" pitchFamily="18" charset="0"/>
+                      </a:rPr>
+                      <m:t>&gt;′</m:t>
+                    </m:r>
+                  </m:oMath>
+                </a14:m>
+                <a:r>
+                  <a:rPr lang="en-US" dirty="0"/>
+                  <a:t> to commit the file to git with the custom message. </a:t>
+                </a:r>
+              </a:p>
+            </p:txBody>
+          </p:sp>
+        </mc:Choice>
+        <mc:Fallback>
+          <p:sp>
+            <p:nvSpPr>
+              <p:cNvPr id="7" name="TextBox 6">
+                <a:extLst>
+                  <a:ext uri="{FF2B5EF4-FFF2-40B4-BE49-F238E27FC236}">
+                    <a16:creationId xmlns:a16="http://schemas.microsoft.com/office/drawing/2014/main" id="{34E7E516-55F9-0239-3066-30A41C6B5529}"/>
+                  </a:ext>
+                </a:extLst>
+              </p:cNvPr>
+              <p:cNvSpPr txBox="1">
+                <a:spLocks noRot="1" noChangeAspect="1" noMove="1" noResize="1" noEditPoints="1" noAdjustHandles="1" noChangeArrowheads="1" noChangeShapeType="1" noTextEdit="1"/>
+              </p:cNvSpPr>
+              <p:nvPr/>
+            </p:nvSpPr>
+            <p:spPr>
+              <a:xfrm>
+                <a:off x="245772" y="5731099"/>
+                <a:ext cx="11680065" cy="378180"/>
+              </a:xfrm>
+              <a:prstGeom prst="rect">
+                <a:avLst/>
+              </a:prstGeom>
+              <a:blipFill>
+                <a:blip r:embed="rId3"/>
+                <a:stretch>
+                  <a:fillRect l="-418" t="-6452" b="-24194"/>
+                </a:stretch>
+              </a:blipFill>
+            </p:spPr>
+            <p:txBody>
+              <a:bodyPr/>
+              <a:lstStyle/>
+              <a:p>
+                <a:r>
+                  <a:rPr lang="en-US">
+                    <a:noFill/>
+                  </a:rPr>
+                  <a:t> </a:t>
+                </a:r>
+              </a:p>
+            </p:txBody>
+          </p:sp>
+        </mc:Fallback>
+      </mc:AlternateContent>
+    </p:spTree>
+    <p:extLst>
+      <p:ext uri="{BB962C8B-B14F-4D97-AF65-F5344CB8AC3E}">
+        <p14:creationId xmlns:p14="http://schemas.microsoft.com/office/powerpoint/2010/main" val="2758067012"/>
+      </p:ext>
+    </p:extLst>
+  </p:cSld>
+  <p:clrMapOvr>
+    <a:masterClrMapping/>
+  </p:clrMapOvr>
+</p:sld>
+</file>
+
+<file path=ppt/slides/slide8.xml><?xml version="1.0" encoding="utf-8"?>
+<p:sld xmlns:a="http://schemas.openxmlformats.org/drawingml/2006/main" xmlns:r="http://schemas.openxmlformats.org/officeDocument/2006/relationships" xmlns:p="http://schemas.openxmlformats.org/presentationml/2006/main">
+  <p:cSld>
+    <p:spTree>
+      <p:nvGrpSpPr>
+        <p:cNvPr id="1" name=""/>
+        <p:cNvGrpSpPr/>
+        <p:nvPr/>
+      </p:nvGrpSpPr>
+      <p:grpSpPr>
+        <a:xfrm>
+          <a:off x="0" y="0"/>
+          <a:ext cx="0" cy="0"/>
+          <a:chOff x="0" y="0"/>
+          <a:chExt cx="0" cy="0"/>
+        </a:xfrm>
+      </p:grpSpPr>
+      <p:sp>
+        <p:nvSpPr>
+          <p:cNvPr id="4" name="Title 1">
+            <a:extLst>
+              <a:ext uri="{FF2B5EF4-FFF2-40B4-BE49-F238E27FC236}">
+                <a16:creationId xmlns:a16="http://schemas.microsoft.com/office/drawing/2014/main" id="{CD8A224B-BAA3-7CF0-AEB4-EE369F90E588}"/>
+              </a:ext>
+            </a:extLst>
+          </p:cNvPr>
+          <p:cNvSpPr txBox="1">
+            <a:spLocks/>
+          </p:cNvSpPr>
+          <p:nvPr/>
+        </p:nvSpPr>
+        <p:spPr>
+          <a:xfrm>
+            <a:off x="245772" y="262095"/>
+            <a:ext cx="10515600" cy="356092"/>
+          </a:xfrm>
+          <a:prstGeom prst="rect">
+            <a:avLst/>
+          </a:prstGeom>
+        </p:spPr>
+        <p:txBody>
+          <a:bodyPr vert="horz" lIns="91440" tIns="45720" rIns="91440" bIns="45720" rtlCol="0" anchor="ctr">
+            <a:noAutofit/>
+          </a:bodyPr>
+          <a:lstStyle>
+            <a:lvl1pPr algn="l" defTabSz="914400" rtl="0" eaLnBrk="1" latinLnBrk="0" hangingPunct="1">
+              <a:lnSpc>
+                <a:spcPct val="90000"/>
+              </a:lnSpc>
+              <a:spcBef>
+                <a:spcPct val="0"/>
+              </a:spcBef>
+              <a:buNone/>
+              <a:defRPr sz="4400" kern="1200">
+                <a:solidFill>
+                  <a:schemeClr val="tx1"/>
+                </a:solidFill>
+                <a:latin typeface="+mj-lt"/>
+                <a:ea typeface="+mj-ea"/>
+                <a:cs typeface="+mj-cs"/>
+              </a:defRPr>
+            </a:lvl1pPr>
+          </a:lstStyle>
+          <a:p>
+            <a:r>
+              <a:rPr lang="en-US" sz="3200" dirty="0"/>
+              <a:t>.</a:t>
+            </a:r>
+            <a:r>
+              <a:rPr lang="en-US" sz="3200" dirty="0" err="1"/>
+              <a:t>gitignore</a:t>
+            </a:r>
+            <a:r>
+              <a:rPr lang="en-US" sz="3200" dirty="0"/>
+              <a:t> file</a:t>
+            </a:r>
+          </a:p>
+        </p:txBody>
+      </p:sp>
+      <mc:AlternateContent xmlns:mc="http://schemas.openxmlformats.org/markup-compatibility/2006">
+        <mc:Choice xmlns:a14="http://schemas.microsoft.com/office/drawing/2010/main" Requires="a14">
+          <p:sp>
+            <p:nvSpPr>
+              <p:cNvPr id="5" name="TextBox 4">
+                <a:extLst>
+                  <a:ext uri="{FF2B5EF4-FFF2-40B4-BE49-F238E27FC236}">
+                    <a16:creationId xmlns:a16="http://schemas.microsoft.com/office/drawing/2014/main" id="{68BE3AF2-2538-84EE-90CD-79087CAB6DAC}"/>
+                  </a:ext>
+                </a:extLst>
+              </p:cNvPr>
+              <p:cNvSpPr txBox="1"/>
+              <p:nvPr/>
+            </p:nvSpPr>
+            <p:spPr>
+              <a:xfrm>
+                <a:off x="7701565" y="862885"/>
+                <a:ext cx="4172755" cy="1200329"/>
+              </a:xfrm>
+              <a:prstGeom prst="rect">
+                <a:avLst/>
+              </a:prstGeom>
+              <a:noFill/>
+            </p:spPr>
+            <p:txBody>
+              <a:bodyPr wrap="square" rtlCol="0">
+                <a:spAutoFit/>
+              </a:bodyPr>
+              <a:lstStyle/>
+              <a:p>
+                <a:r>
+                  <a:rPr lang="en-US" dirty="0"/>
+                  <a:t>This is the file that will have the list of all the files and folders that we don’t want to include for the </a:t>
+                </a:r>
+                <a14:m>
+                  <m:oMath xmlns:m="http://schemas.openxmlformats.org/officeDocument/2006/math">
+                    <m:r>
+                      <a:rPr lang="en-US" b="0" i="1" smtClean="0">
+                        <a:latin typeface="Cambria Math" panose="02040503050406030204" pitchFamily="18" charset="0"/>
+                      </a:rPr>
+                      <m:t>$ </m:t>
+                    </m:r>
+                    <m:r>
+                      <a:rPr lang="en-US" b="0" i="1" smtClean="0">
+                        <a:latin typeface="Cambria Math" panose="02040503050406030204" pitchFamily="18" charset="0"/>
+                      </a:rPr>
+                      <m:t>𝑔𝑖𝑡</m:t>
+                    </m:r>
+                    <m:r>
+                      <a:rPr lang="en-US" b="0" i="1" smtClean="0">
+                        <a:latin typeface="Cambria Math" panose="02040503050406030204" pitchFamily="18" charset="0"/>
+                      </a:rPr>
+                      <m:t> </m:t>
+                    </m:r>
+                    <m:r>
+                      <a:rPr lang="en-US" b="0" i="1" smtClean="0">
+                        <a:latin typeface="Cambria Math" panose="02040503050406030204" pitchFamily="18" charset="0"/>
+                      </a:rPr>
+                      <m:t>𝑎𝑑𝑑</m:t>
+                    </m:r>
+                    <m:r>
+                      <a:rPr lang="en-US" b="0" i="1" smtClean="0">
+                        <a:latin typeface="Cambria Math" panose="02040503050406030204" pitchFamily="18" charset="0"/>
+                      </a:rPr>
+                      <m:t> </m:t>
+                    </m:r>
+                  </m:oMath>
+                </a14:m>
+                <a:r>
+                  <a:rPr lang="en-US" dirty="0"/>
+                  <a:t>command.</a:t>
+                </a:r>
+              </a:p>
+              <a:p>
+                <a:endParaRPr lang="en-US" dirty="0"/>
+              </a:p>
+            </p:txBody>
+          </p:sp>
+        </mc:Choice>
+        <mc:Fallback>
+          <p:sp>
+            <p:nvSpPr>
+              <p:cNvPr id="5" name="TextBox 4">
+                <a:extLst>
+                  <a:ext uri="{FF2B5EF4-FFF2-40B4-BE49-F238E27FC236}">
+                    <a16:creationId xmlns:a16="http://schemas.microsoft.com/office/drawing/2014/main" id="{68BE3AF2-2538-84EE-90CD-79087CAB6DAC}"/>
+                  </a:ext>
+                </a:extLst>
+              </p:cNvPr>
+              <p:cNvSpPr txBox="1">
+                <a:spLocks noRot="1" noChangeAspect="1" noMove="1" noResize="1" noEditPoints="1" noAdjustHandles="1" noChangeArrowheads="1" noChangeShapeType="1" noTextEdit="1"/>
+              </p:cNvSpPr>
+              <p:nvPr/>
+            </p:nvSpPr>
+            <p:spPr>
+              <a:xfrm>
+                <a:off x="7701565" y="862885"/>
+                <a:ext cx="4172755" cy="1200329"/>
+              </a:xfrm>
+              <a:prstGeom prst="rect">
+                <a:avLst/>
+              </a:prstGeom>
+              <a:blipFill>
+                <a:blip r:embed="rId2"/>
+                <a:stretch>
+                  <a:fillRect l="-1168" t="-3061" r="-584"/>
+                </a:stretch>
+              </a:blipFill>
+            </p:spPr>
+            <p:txBody>
+              <a:bodyPr/>
+              <a:lstStyle/>
+              <a:p>
+                <a:r>
+                  <a:rPr lang="en-US">
+                    <a:noFill/>
+                  </a:rPr>
+                  <a:t> </a:t>
+                </a:r>
+              </a:p>
+            </p:txBody>
+          </p:sp>
+        </mc:Fallback>
+      </mc:AlternateContent>
+      <p:pic>
+        <p:nvPicPr>
+          <p:cNvPr id="7" name="Picture 6">
+            <a:extLst>
+              <a:ext uri="{FF2B5EF4-FFF2-40B4-BE49-F238E27FC236}">
+                <a16:creationId xmlns:a16="http://schemas.microsoft.com/office/drawing/2014/main" id="{232E2966-B296-AA73-B171-9B0502D86FBF}"/>
+              </a:ext>
+            </a:extLst>
+          </p:cNvPr>
+          <p:cNvPicPr>
+            <a:picLocks noChangeAspect="1"/>
+          </p:cNvPicPr>
+          <p:nvPr/>
+        </p:nvPicPr>
+        <p:blipFill>
+          <a:blip r:embed="rId3"/>
+          <a:stretch>
+            <a:fillRect/>
+          </a:stretch>
+        </p:blipFill>
+        <p:spPr>
+          <a:xfrm>
+            <a:off x="245772" y="862885"/>
+            <a:ext cx="6992155" cy="5825089"/>
+          </a:xfrm>
+          <a:prstGeom prst="rect">
+            <a:avLst/>
+          </a:prstGeom>
+        </p:spPr>
+      </p:pic>
+      <p:pic>
+        <p:nvPicPr>
+          <p:cNvPr id="9" name="Picture 8">
+            <a:extLst>
+              <a:ext uri="{FF2B5EF4-FFF2-40B4-BE49-F238E27FC236}">
+                <a16:creationId xmlns:a16="http://schemas.microsoft.com/office/drawing/2014/main" id="{D66E320B-B472-4430-4A34-0B8813DDF9B7}"/>
+              </a:ext>
+            </a:extLst>
+          </p:cNvPr>
+          <p:cNvPicPr>
+            <a:picLocks noChangeAspect="1"/>
+          </p:cNvPicPr>
+          <p:nvPr/>
+        </p:nvPicPr>
+        <p:blipFill>
+          <a:blip r:embed="rId4"/>
+          <a:stretch>
+            <a:fillRect/>
+          </a:stretch>
+        </p:blipFill>
+        <p:spPr>
+          <a:xfrm>
+            <a:off x="7701564" y="2502256"/>
+            <a:ext cx="4172755" cy="4093649"/>
+          </a:xfrm>
+          <a:prstGeom prst="rect">
+            <a:avLst/>
+          </a:prstGeom>
+        </p:spPr>
+      </p:pic>
+    </p:spTree>
+    <p:extLst>
+      <p:ext uri="{BB962C8B-B14F-4D97-AF65-F5344CB8AC3E}">
+        <p14:creationId xmlns:p14="http://schemas.microsoft.com/office/powerpoint/2010/main" val="530232538"/>
+      </p:ext>
+    </p:extLst>
+  </p:cSld>
+  <p:clrMapOvr>
+    <a:masterClrMapping/>
+  </p:clrMapOvr>
+</p:sld>
+</file>
+
+<file path=ppt/slides/slide9.xml><?xml version="1.0" encoding="utf-8"?>
+<p:sld xmlns:a="http://schemas.openxmlformats.org/drawingml/2006/main" xmlns:r="http://schemas.openxmlformats.org/officeDocument/2006/relationships" xmlns:p="http://schemas.openxmlformats.org/presentationml/2006/main">
+  <p:cSld>
+    <p:spTree>
+      <p:nvGrpSpPr>
+        <p:cNvPr id="1" name=""/>
+        <p:cNvGrpSpPr/>
+        <p:nvPr/>
+      </p:nvGrpSpPr>
+      <p:grpSpPr>
+        <a:xfrm>
+          <a:off x="0" y="0"/>
+          <a:ext cx="0" cy="0"/>
+          <a:chOff x="0" y="0"/>
+          <a:chExt cx="0" cy="0"/>
+        </a:xfrm>
+      </p:grpSpPr>
+      <p:pic>
+        <p:nvPicPr>
+          <p:cNvPr id="6" name="Content Placeholder 5">
+            <a:extLst>
+              <a:ext uri="{FF2B5EF4-FFF2-40B4-BE49-F238E27FC236}">
+                <a16:creationId xmlns:a16="http://schemas.microsoft.com/office/drawing/2014/main" id="{C924BC43-7121-75F8-09E5-95E56170C5B4}"/>
+              </a:ext>
+            </a:extLst>
+          </p:cNvPr>
+          <p:cNvPicPr>
+            <a:picLocks noGrp="1" noChangeAspect="1"/>
+          </p:cNvPicPr>
+          <p:nvPr>
+            <p:ph idx="1"/>
+          </p:nvPr>
+        </p:nvPicPr>
+        <p:blipFill>
+          <a:blip r:embed="rId2"/>
+          <a:stretch>
+            <a:fillRect/>
+          </a:stretch>
+        </p:blipFill>
+        <p:spPr>
+          <a:xfrm>
+            <a:off x="245771" y="854818"/>
+            <a:ext cx="10927309" cy="1978533"/>
+          </a:xfrm>
+        </p:spPr>
+      </p:pic>
+      <p:sp>
+        <p:nvSpPr>
+          <p:cNvPr id="4" name="Title 1">
+            <a:extLst>
+              <a:ext uri="{FF2B5EF4-FFF2-40B4-BE49-F238E27FC236}">
+                <a16:creationId xmlns:a16="http://schemas.microsoft.com/office/drawing/2014/main" id="{E4F5D3C5-C3C6-7CCC-0941-5F0D918CB82B}"/>
+              </a:ext>
+            </a:extLst>
+          </p:cNvPr>
+          <p:cNvSpPr txBox="1">
+            <a:spLocks/>
+          </p:cNvSpPr>
+          <p:nvPr/>
+        </p:nvSpPr>
+        <p:spPr>
+          <a:xfrm>
+            <a:off x="245772" y="262095"/>
+            <a:ext cx="10515600" cy="356092"/>
+          </a:xfrm>
+          <a:prstGeom prst="rect">
+            <a:avLst/>
+          </a:prstGeom>
+        </p:spPr>
+        <p:txBody>
+          <a:bodyPr vert="horz" lIns="91440" tIns="45720" rIns="91440" bIns="45720" rtlCol="0" anchor="ctr">
+            <a:noAutofit/>
+          </a:bodyPr>
+          <a:lstStyle>
+            <a:lvl1pPr algn="l" defTabSz="914400" rtl="0" eaLnBrk="1" latinLnBrk="0" hangingPunct="1">
+              <a:lnSpc>
+                <a:spcPct val="90000"/>
+              </a:lnSpc>
+              <a:spcBef>
+                <a:spcPct val="0"/>
+              </a:spcBef>
+              <a:buNone/>
+              <a:defRPr sz="4400" kern="1200">
+                <a:solidFill>
+                  <a:schemeClr val="tx1"/>
+                </a:solidFill>
+                <a:latin typeface="+mj-lt"/>
+                <a:ea typeface="+mj-ea"/>
+                <a:cs typeface="+mj-cs"/>
+              </a:defRPr>
+            </a:lvl1pPr>
+          </a:lstStyle>
+          <a:p>
+            <a:r>
+              <a:rPr lang="en-US" sz="3200" dirty="0"/>
+              <a:t>Creating a new branch (for commit)</a:t>
+            </a:r>
+          </a:p>
+        </p:txBody>
+      </p:sp>
+      <mc:AlternateContent xmlns:mc="http://schemas.openxmlformats.org/markup-compatibility/2006">
+        <mc:Choice xmlns:a14="http://schemas.microsoft.com/office/drawing/2010/main" Requires="a14">
+          <p:sp>
+            <p:nvSpPr>
+              <p:cNvPr id="7" name="TextBox 6">
+                <a:extLst>
+                  <a:ext uri="{FF2B5EF4-FFF2-40B4-BE49-F238E27FC236}">
+                    <a16:creationId xmlns:a16="http://schemas.microsoft.com/office/drawing/2014/main" id="{E399A934-C91B-EEDA-4C7A-FA9FBF5E75A9}"/>
+                  </a:ext>
+                </a:extLst>
+              </p:cNvPr>
+              <p:cNvSpPr txBox="1"/>
+              <p:nvPr/>
+            </p:nvSpPr>
+            <p:spPr>
+              <a:xfrm>
+                <a:off x="245771" y="3193961"/>
+                <a:ext cx="11551277" cy="1477328"/>
+              </a:xfrm>
+              <a:prstGeom prst="rect">
+                <a:avLst/>
+              </a:prstGeom>
+              <a:noFill/>
+            </p:spPr>
+            <p:txBody>
+              <a:bodyPr wrap="square" rtlCol="0">
+                <a:spAutoFit/>
+              </a:bodyPr>
+              <a:lstStyle/>
+              <a:p>
+                <a:r>
+                  <a:rPr lang="en-US" dirty="0"/>
+                  <a:t>To create a new branch, run </a:t>
+                </a:r>
+                <a14:m>
+                  <m:oMath xmlns:m="http://schemas.openxmlformats.org/officeDocument/2006/math">
+                    <m:r>
+                      <a:rPr lang="en-US" b="0" i="1" smtClean="0">
+                        <a:latin typeface="Cambria Math" panose="02040503050406030204" pitchFamily="18" charset="0"/>
+                      </a:rPr>
+                      <m:t>$ </m:t>
+                    </m:r>
+                    <m:r>
+                      <a:rPr lang="en-US" b="0" i="1" smtClean="0">
+                        <a:latin typeface="Cambria Math" panose="02040503050406030204" pitchFamily="18" charset="0"/>
+                      </a:rPr>
+                      <m:t>𝑔𝑖𝑡</m:t>
+                    </m:r>
+                    <m:r>
+                      <a:rPr lang="en-US" b="0" i="1" smtClean="0">
+                        <a:latin typeface="Cambria Math" panose="02040503050406030204" pitchFamily="18" charset="0"/>
+                      </a:rPr>
+                      <m:t> </m:t>
+                    </m:r>
+                    <m:r>
+                      <a:rPr lang="en-US" b="0" i="1" smtClean="0">
+                        <a:latin typeface="Cambria Math" panose="02040503050406030204" pitchFamily="18" charset="0"/>
+                      </a:rPr>
+                      <m:t>𝑏𝑟𝑎𝑛𝑐h</m:t>
+                    </m:r>
+                    <m:r>
+                      <a:rPr lang="en-US" b="0" i="1" smtClean="0">
+                        <a:latin typeface="Cambria Math" panose="02040503050406030204" pitchFamily="18" charset="0"/>
+                      </a:rPr>
+                      <m:t>&lt;</m:t>
+                    </m:r>
+                    <m:r>
+                      <a:rPr lang="en-US" b="0" i="1" smtClean="0">
+                        <a:latin typeface="Cambria Math" panose="02040503050406030204" pitchFamily="18" charset="0"/>
+                      </a:rPr>
+                      <m:t>𝑛𝑒𝑤</m:t>
+                    </m:r>
+                    <m:r>
+                      <a:rPr lang="en-US" b="0" i="1" smtClean="0">
+                        <a:latin typeface="Cambria Math" panose="02040503050406030204" pitchFamily="18" charset="0"/>
+                      </a:rPr>
+                      <m:t> </m:t>
+                    </m:r>
+                    <m:r>
+                      <a:rPr lang="en-US" b="0" i="1" smtClean="0">
+                        <a:latin typeface="Cambria Math" panose="02040503050406030204" pitchFamily="18" charset="0"/>
+                      </a:rPr>
+                      <m:t>𝑏𝑟𝑎𝑛𝑐h</m:t>
+                    </m:r>
+                    <m:r>
+                      <a:rPr lang="en-US" b="0" i="1" smtClean="0">
+                        <a:latin typeface="Cambria Math" panose="02040503050406030204" pitchFamily="18" charset="0"/>
+                      </a:rPr>
+                      <m:t> </m:t>
+                    </m:r>
+                    <m:r>
+                      <a:rPr lang="en-US" b="0" i="1" smtClean="0">
+                        <a:latin typeface="Cambria Math" panose="02040503050406030204" pitchFamily="18" charset="0"/>
+                      </a:rPr>
+                      <m:t>𝑛𝑎𝑚𝑒</m:t>
+                    </m:r>
+                    <m:r>
+                      <a:rPr lang="en-US" b="0" i="1" smtClean="0">
+                        <a:latin typeface="Cambria Math" panose="02040503050406030204" pitchFamily="18" charset="0"/>
+                      </a:rPr>
+                      <m:t>&gt;</m:t>
+                    </m:r>
+                  </m:oMath>
+                </a14:m>
+                <a:endParaRPr lang="en-US" dirty="0"/>
+              </a:p>
+              <a:p>
+                <a:endParaRPr lang="en-US" dirty="0"/>
+              </a:p>
+              <a:p>
+                <a:r>
+                  <a:rPr lang="en-US" dirty="0"/>
+                  <a:t>To Switch to a different branch, run </a:t>
+                </a:r>
+                <a14:m>
+                  <m:oMath xmlns:m="http://schemas.openxmlformats.org/officeDocument/2006/math">
+                    <m:r>
+                      <a:rPr lang="en-US" b="0" i="1" smtClean="0">
+                        <a:latin typeface="Cambria Math" panose="02040503050406030204" pitchFamily="18" charset="0"/>
+                      </a:rPr>
+                      <m:t>$ </m:t>
+                    </m:r>
+                    <m:r>
+                      <a:rPr lang="en-US" b="0" i="1" smtClean="0">
+                        <a:latin typeface="Cambria Math" panose="02040503050406030204" pitchFamily="18" charset="0"/>
+                      </a:rPr>
+                      <m:t>𝑔𝑖𝑡</m:t>
+                    </m:r>
+                    <m:r>
+                      <a:rPr lang="en-US" b="0" i="1" smtClean="0">
+                        <a:latin typeface="Cambria Math" panose="02040503050406030204" pitchFamily="18" charset="0"/>
+                      </a:rPr>
+                      <m:t> </m:t>
+                    </m:r>
+                    <m:r>
+                      <a:rPr lang="en-US" b="0" i="1" smtClean="0">
+                        <a:latin typeface="Cambria Math" panose="02040503050406030204" pitchFamily="18" charset="0"/>
+                      </a:rPr>
+                      <m:t>𝑐h𝑒𝑐𝑘𝑜𝑢𝑡</m:t>
+                    </m:r>
+                    <m:r>
+                      <a:rPr lang="en-US" b="0" i="1" smtClean="0">
+                        <a:latin typeface="Cambria Math" panose="02040503050406030204" pitchFamily="18" charset="0"/>
+                      </a:rPr>
+                      <m:t>&lt;</m:t>
+                    </m:r>
+                    <m:r>
+                      <a:rPr lang="en-US" b="0" i="1" smtClean="0">
+                        <a:latin typeface="Cambria Math" panose="02040503050406030204" pitchFamily="18" charset="0"/>
+                      </a:rPr>
+                      <m:t>𝑜𝑡h𝑒𝑟</m:t>
+                    </m:r>
+                    <m:r>
+                      <a:rPr lang="en-US" b="0" i="1" smtClean="0">
+                        <a:latin typeface="Cambria Math" panose="02040503050406030204" pitchFamily="18" charset="0"/>
+                      </a:rPr>
+                      <m:t> </m:t>
+                    </m:r>
+                    <m:r>
+                      <a:rPr lang="en-US" b="0" i="1" smtClean="0">
+                        <a:latin typeface="Cambria Math" panose="02040503050406030204" pitchFamily="18" charset="0"/>
+                      </a:rPr>
+                      <m:t>𝑏𝑟𝑎𝑛𝑐h</m:t>
+                    </m:r>
+                    <m:r>
+                      <a:rPr lang="en-US" b="0" i="1" smtClean="0">
+                        <a:latin typeface="Cambria Math" panose="02040503050406030204" pitchFamily="18" charset="0"/>
+                      </a:rPr>
+                      <m:t> </m:t>
+                    </m:r>
+                    <m:r>
+                      <a:rPr lang="en-US" b="0" i="1" smtClean="0">
+                        <a:latin typeface="Cambria Math" panose="02040503050406030204" pitchFamily="18" charset="0"/>
+                      </a:rPr>
+                      <m:t>𝑛𝑎𝑚𝑒</m:t>
+                    </m:r>
+                    <m:r>
+                      <a:rPr lang="en-US" b="0" i="1" smtClean="0">
+                        <a:latin typeface="Cambria Math" panose="02040503050406030204" pitchFamily="18" charset="0"/>
+                      </a:rPr>
+                      <m:t>&gt;</m:t>
+                    </m:r>
+                  </m:oMath>
+                </a14:m>
+                <a:endParaRPr lang="en-US" b="0" dirty="0"/>
+              </a:p>
+              <a:p>
+                <a:endParaRPr lang="en-US" dirty="0"/>
+              </a:p>
+              <a:p>
+                <a:r>
+                  <a:rPr lang="en-US" dirty="0"/>
+                  <a:t>Once we are switched to a other branch, we can do the same stuff there and commit it to the other branch.</a:t>
+                </a:r>
+              </a:p>
+            </p:txBody>
+          </p:sp>
+        </mc:Choice>
+        <mc:Fallback>
+          <p:sp>
+            <p:nvSpPr>
+              <p:cNvPr id="7" name="TextBox 6">
+                <a:extLst>
+                  <a:ext uri="{FF2B5EF4-FFF2-40B4-BE49-F238E27FC236}">
+                    <a16:creationId xmlns:a16="http://schemas.microsoft.com/office/drawing/2014/main" id="{E399A934-C91B-EEDA-4C7A-FA9FBF5E75A9}"/>
+                  </a:ext>
+                </a:extLst>
+              </p:cNvPr>
+              <p:cNvSpPr txBox="1">
+                <a:spLocks noRot="1" noChangeAspect="1" noMove="1" noResize="1" noEditPoints="1" noAdjustHandles="1" noChangeArrowheads="1" noChangeShapeType="1" noTextEdit="1"/>
+              </p:cNvSpPr>
+              <p:nvPr/>
+            </p:nvSpPr>
+            <p:spPr>
+              <a:xfrm>
+                <a:off x="245771" y="3193961"/>
+                <a:ext cx="11551277" cy="1477328"/>
+              </a:xfrm>
+              <a:prstGeom prst="rect">
+                <a:avLst/>
+              </a:prstGeom>
+              <a:blipFill>
+                <a:blip r:embed="rId3"/>
+                <a:stretch>
+                  <a:fillRect l="-422" t="-2479" b="-5785"/>
+                </a:stretch>
+              </a:blipFill>
+            </p:spPr>
+            <p:txBody>
+              <a:bodyPr/>
+              <a:lstStyle/>
+              <a:p>
+                <a:r>
+                  <a:rPr lang="en-US">
+                    <a:noFill/>
+                  </a:rPr>
+                  <a:t> </a:t>
+                </a:r>
+              </a:p>
+            </p:txBody>
+          </p:sp>
+        </mc:Fallback>
+      </mc:AlternateContent>
+    </p:spTree>
+    <p:extLst>
+      <p:ext uri="{BB962C8B-B14F-4D97-AF65-F5344CB8AC3E}">
+        <p14:creationId xmlns:p14="http://schemas.microsoft.com/office/powerpoint/2010/main" val="2811744785"/>
       </p:ext>
     </p:extLst>
   </p:cSld>

</xml_diff>